<commit_message>
Added additional Presentation slides & details
</commit_message>
<xml_diff>
--- a/TRL_final/Textbook Rental Library - Presentation.pptx
+++ b/TRL_final/Textbook Rental Library - Presentation.pptx
@@ -6,9 +6,11 @@
   </p:sldMasterIdLst>
   <p:sldIdLst>
     <p:sldId id="256" r:id="rId2"/>
-    <p:sldId id="257" r:id="rId3"/>
-    <p:sldId id="259" r:id="rId4"/>
-    <p:sldId id="258" r:id="rId5"/>
+    <p:sldId id="261" r:id="rId3"/>
+    <p:sldId id="257" r:id="rId4"/>
+    <p:sldId id="259" r:id="rId5"/>
+    <p:sldId id="260" r:id="rId6"/>
+    <p:sldId id="258" r:id="rId7"/>
   </p:sldIdLst>
   <p:sldSz cx="12192000" cy="6858000"/>
   <p:notesSz cx="6858000" cy="9144000"/>
@@ -107,6 +109,11 @@
       </a:defRPr>
     </a:lvl9pPr>
   </p:defaultTextStyle>
+  <p:extLst>
+    <p:ext uri="{EFAFB233-063F-42B5-8137-9DF3F51BA10A}">
+      <p15:sldGuideLst xmlns:p15="http://schemas.microsoft.com/office/powerpoint/2012/main"/>
+    </p:ext>
+  </p:extLst>
 </p:presentation>
 </file>
 
@@ -7725,7 +7732,7 @@
           <p:cNvPr id="2" name="Title 1">
             <a:extLst>
               <a:ext uri="{FF2B5EF4-FFF2-40B4-BE49-F238E27FC236}">
-                <a16:creationId xmlns:a16="http://schemas.microsoft.com/office/drawing/2014/main" id="{8B7C478B-E896-497A-8493-0D09F4A744A2}"/>
+                <a16:creationId xmlns:a16="http://schemas.microsoft.com/office/drawing/2014/main" id="{CB0D29CC-B3DB-4A69-AC0F-1FCE31AC0BC7}"/>
               </a:ext>
             </a:extLst>
           </p:cNvPr>
@@ -7742,9 +7749,10 @@
           <a:lstStyle/>
           <a:p>
             <a:r>
-              <a:rPr lang="en-US" dirty="0"/>
-              <a:t>Use Cases</a:t>
-            </a:r>
+              <a:rPr lang="en-US" dirty="0" err="1"/>
+              <a:t>DoCD</a:t>
+            </a:r>
+            <a:endParaRPr lang="en-US" dirty="0"/>
           </a:p>
         </p:txBody>
       </p:sp>
@@ -7753,7 +7761,7 @@
           <p:cNvPr id="3" name="Content Placeholder 2">
             <a:extLst>
               <a:ext uri="{FF2B5EF4-FFF2-40B4-BE49-F238E27FC236}">
-                <a16:creationId xmlns:a16="http://schemas.microsoft.com/office/drawing/2014/main" id="{1CC6B4EF-EDB0-478E-BB6F-EEA16EFFAFBB}"/>
+                <a16:creationId xmlns:a16="http://schemas.microsoft.com/office/drawing/2014/main" id="{771D44E2-710D-4824-BE01-C324BCD24D65}"/>
               </a:ext>
             </a:extLst>
           </p:cNvPr>
@@ -7766,28 +7774,17 @@
         </p:nvSpPr>
         <p:spPr/>
         <p:txBody>
-          <a:bodyPr>
-            <a:normAutofit/>
-          </a:bodyPr>
+          <a:bodyPr/>
           <a:lstStyle/>
           <a:p>
-            <a:r>
-              <a:rPr lang="en-US" sz="2400" dirty="0"/>
-              <a:t>UC1: Worker Checks Out Copies to Patron</a:t>
-            </a:r>
-          </a:p>
-          <a:p>
-            <a:r>
-              <a:rPr lang="en-US" sz="2400" dirty="0"/>
-              <a:t>UC2: Worker Checks In Copies from Patron</a:t>
-            </a:r>
+            <a:endParaRPr lang="en-US"/>
           </a:p>
         </p:txBody>
       </p:sp>
     </p:spTree>
     <p:extLst>
       <p:ext uri="{BB962C8B-B14F-4D97-AF65-F5344CB8AC3E}">
-        <p14:creationId xmlns:p14="http://schemas.microsoft.com/office/powerpoint/2010/main" val="1713578123"/>
+        <p14:creationId xmlns:p14="http://schemas.microsoft.com/office/powerpoint/2010/main" val="2935148051"/>
       </p:ext>
     </p:extLst>
   </p:cSld>
@@ -7819,6 +7816,100 @@
           <p:cNvPr id="2" name="Title 1">
             <a:extLst>
               <a:ext uri="{FF2B5EF4-FFF2-40B4-BE49-F238E27FC236}">
+                <a16:creationId xmlns:a16="http://schemas.microsoft.com/office/drawing/2014/main" id="{8B7C478B-E896-497A-8493-0D09F4A744A2}"/>
+              </a:ext>
+            </a:extLst>
+          </p:cNvPr>
+          <p:cNvSpPr>
+            <a:spLocks noGrp="1"/>
+          </p:cNvSpPr>
+          <p:nvPr>
+            <p:ph type="title"/>
+          </p:nvPr>
+        </p:nvSpPr>
+        <p:spPr/>
+        <p:txBody>
+          <a:bodyPr/>
+          <a:lstStyle/>
+          <a:p>
+            <a:r>
+              <a:rPr lang="en-US" dirty="0"/>
+              <a:t>Use Cases</a:t>
+            </a:r>
+          </a:p>
+        </p:txBody>
+      </p:sp>
+      <p:sp>
+        <p:nvSpPr>
+          <p:cNvPr id="3" name="Content Placeholder 2">
+            <a:extLst>
+              <a:ext uri="{FF2B5EF4-FFF2-40B4-BE49-F238E27FC236}">
+                <a16:creationId xmlns:a16="http://schemas.microsoft.com/office/drawing/2014/main" id="{1CC6B4EF-EDB0-478E-BB6F-EEA16EFFAFBB}"/>
+              </a:ext>
+            </a:extLst>
+          </p:cNvPr>
+          <p:cNvSpPr>
+            <a:spLocks noGrp="1"/>
+          </p:cNvSpPr>
+          <p:nvPr>
+            <p:ph idx="1"/>
+          </p:nvPr>
+        </p:nvSpPr>
+        <p:spPr/>
+        <p:txBody>
+          <a:bodyPr>
+            <a:normAutofit/>
+          </a:bodyPr>
+          <a:lstStyle/>
+          <a:p>
+            <a:r>
+              <a:rPr lang="en-US" sz="2400" dirty="0"/>
+              <a:t>UC1: Worker Checks Out Copies to Patron</a:t>
+            </a:r>
+          </a:p>
+          <a:p>
+            <a:r>
+              <a:rPr lang="en-US" sz="2400" dirty="0"/>
+              <a:t>UC2: Worker Checks In Copies from Patron</a:t>
+            </a:r>
+          </a:p>
+        </p:txBody>
+      </p:sp>
+    </p:spTree>
+    <p:extLst>
+      <p:ext uri="{BB962C8B-B14F-4D97-AF65-F5344CB8AC3E}">
+        <p14:creationId xmlns:p14="http://schemas.microsoft.com/office/powerpoint/2010/main" val="1713578123"/>
+      </p:ext>
+    </p:extLst>
+  </p:cSld>
+  <p:clrMapOvr>
+    <a:masterClrMapping/>
+  </p:clrMapOvr>
+</p:sld>
+</file>
+
+<file path=ppt/slides/slide4.xml><?xml version="1.0" encoding="utf-8"?>
+<p:sld xmlns:a="http://schemas.openxmlformats.org/drawingml/2006/main" xmlns:r="http://schemas.openxmlformats.org/officeDocument/2006/relationships" xmlns:p="http://schemas.openxmlformats.org/presentationml/2006/main">
+  <p:cSld>
+    <p:spTree>
+      <p:nvGrpSpPr>
+        <p:cNvPr id="1" name=""/>
+        <p:cNvGrpSpPr/>
+        <p:nvPr/>
+      </p:nvGrpSpPr>
+      <p:grpSpPr>
+        <a:xfrm>
+          <a:off x="0" y="0"/>
+          <a:ext cx="0" cy="0"/>
+          <a:chOff x="0" y="0"/>
+          <a:chExt cx="0" cy="0"/>
+        </a:xfrm>
+      </p:grpSpPr>
+      <p:sp>
+        <p:nvSpPr>
+          <p:cNvPr id="2" name="Title 1">
+            <a:extLst>
+              <a:ext uri="{FF2B5EF4-FFF2-40B4-BE49-F238E27FC236}">
                 <a16:creationId xmlns:a16="http://schemas.microsoft.com/office/drawing/2014/main" id="{EC069840-D3E1-4199-A00F-964672C03CF1}"/>
               </a:ext>
             </a:extLst>
@@ -7836,10 +7927,9 @@
           <a:lstStyle/>
           <a:p>
             <a:r>
-              <a:rPr lang="en-US" dirty="0" err="1"/>
-              <a:t>TRLApp</a:t>
-            </a:r>
-            <a:endParaRPr lang="en-US" dirty="0"/>
+              <a:rPr lang="en-US" dirty="0"/>
+              <a:t>Demonstration: Core</a:t>
+            </a:r>
           </a:p>
         </p:txBody>
       </p:sp>
@@ -7868,8 +7958,36 @@
           <a:p>
             <a:r>
               <a:rPr lang="en-US" sz="2400" dirty="0"/>
-              <a:t>Show running code</a:t>
-            </a:r>
+              <a:t>Out</a:t>
+            </a:r>
+          </a:p>
+          <a:p>
+            <a:r>
+              <a:rPr lang="en-US" sz="2400" dirty="0"/>
+              <a:t>In</a:t>
+            </a:r>
+          </a:p>
+          <a:p>
+            <a:r>
+              <a:rPr lang="en-US" sz="2400" dirty="0"/>
+              <a:t>JUnit Tests &amp; Coverage</a:t>
+            </a:r>
+          </a:p>
+          <a:p>
+            <a:r>
+              <a:rPr lang="en-US" sz="2400" dirty="0"/>
+              <a:t>Software Class Diagram</a:t>
+            </a:r>
+          </a:p>
+          <a:p>
+            <a:endParaRPr lang="en-US" sz="2400" dirty="0"/>
+          </a:p>
+          <a:p>
+            <a:endParaRPr lang="en-US" sz="2400" dirty="0"/>
+          </a:p>
+          <a:p>
+            <a:pPr lvl="1"/>
+            <a:endParaRPr lang="en-US" sz="2200" dirty="0"/>
           </a:p>
         </p:txBody>
       </p:sp>
@@ -7886,7 +8004,119 @@
 </p:sld>
 </file>
 
-<file path=ppt/slides/slide4.xml><?xml version="1.0" encoding="utf-8"?>
+<file path=ppt/slides/slide5.xml><?xml version="1.0" encoding="utf-8"?>
+<p:sld xmlns:a="http://schemas.openxmlformats.org/drawingml/2006/main" xmlns:r="http://schemas.openxmlformats.org/officeDocument/2006/relationships" xmlns:p="http://schemas.openxmlformats.org/presentationml/2006/main">
+  <p:cSld>
+    <p:spTree>
+      <p:nvGrpSpPr>
+        <p:cNvPr id="1" name=""/>
+        <p:cNvGrpSpPr/>
+        <p:nvPr/>
+      </p:nvGrpSpPr>
+      <p:grpSpPr>
+        <a:xfrm>
+          <a:off x="0" y="0"/>
+          <a:ext cx="0" cy="0"/>
+          <a:chOff x="0" y="0"/>
+          <a:chExt cx="0" cy="0"/>
+        </a:xfrm>
+      </p:grpSpPr>
+      <p:sp>
+        <p:nvSpPr>
+          <p:cNvPr id="2" name="Title 1">
+            <a:extLst>
+              <a:ext uri="{FF2B5EF4-FFF2-40B4-BE49-F238E27FC236}">
+                <a16:creationId xmlns:a16="http://schemas.microsoft.com/office/drawing/2014/main" id="{141BAE79-552B-487B-9943-69FF561DFEF5}"/>
+              </a:ext>
+            </a:extLst>
+          </p:cNvPr>
+          <p:cNvSpPr>
+            <a:spLocks noGrp="1"/>
+          </p:cNvSpPr>
+          <p:nvPr>
+            <p:ph type="title"/>
+          </p:nvPr>
+        </p:nvSpPr>
+        <p:spPr/>
+        <p:txBody>
+          <a:bodyPr/>
+          <a:lstStyle/>
+          <a:p>
+            <a:r>
+              <a:rPr lang="en-US" dirty="0"/>
+              <a:t>Demonstration: Additional Features</a:t>
+            </a:r>
+          </a:p>
+        </p:txBody>
+      </p:sp>
+      <p:sp>
+        <p:nvSpPr>
+          <p:cNvPr id="3" name="Content Placeholder 2">
+            <a:extLst>
+              <a:ext uri="{FF2B5EF4-FFF2-40B4-BE49-F238E27FC236}">
+                <a16:creationId xmlns:a16="http://schemas.microsoft.com/office/drawing/2014/main" id="{743757BC-A823-4701-AE28-DA2BF1373112}"/>
+              </a:ext>
+            </a:extLst>
+          </p:cNvPr>
+          <p:cNvSpPr>
+            <a:spLocks noGrp="1"/>
+          </p:cNvSpPr>
+          <p:nvPr>
+            <p:ph idx="1"/>
+          </p:nvPr>
+        </p:nvSpPr>
+        <p:spPr/>
+        <p:txBody>
+          <a:bodyPr>
+            <a:normAutofit/>
+          </a:bodyPr>
+          <a:lstStyle/>
+          <a:p>
+            <a:r>
+              <a:rPr lang="en-US" sz="2400" dirty="0"/>
+              <a:t>Event logging of changes to Patron and Copy state</a:t>
+            </a:r>
+          </a:p>
+          <a:p>
+            <a:r>
+              <a:rPr lang="en-US" sz="2400" dirty="0"/>
+              <a:t>Searching through past Event logs</a:t>
+            </a:r>
+          </a:p>
+          <a:p>
+            <a:r>
+              <a:rPr lang="en-US" sz="2400" dirty="0"/>
+              <a:t>Create and attach Holds to all Patrons with overdue Copies</a:t>
+            </a:r>
+          </a:p>
+          <a:p>
+            <a:r>
+              <a:rPr lang="en-US" sz="2400" dirty="0"/>
+              <a:t>Generate overdue notices for all Patrons with overdue Holds</a:t>
+            </a:r>
+          </a:p>
+          <a:p>
+            <a:r>
+              <a:rPr lang="en-US" sz="2400" dirty="0"/>
+              <a:t>Print overdue notices for all Patrons with overdue Holds</a:t>
+            </a:r>
+          </a:p>
+        </p:txBody>
+      </p:sp>
+    </p:spTree>
+    <p:extLst>
+      <p:ext uri="{BB962C8B-B14F-4D97-AF65-F5344CB8AC3E}">
+        <p14:creationId xmlns:p14="http://schemas.microsoft.com/office/powerpoint/2010/main" val="3004701465"/>
+      </p:ext>
+    </p:extLst>
+  </p:cSld>
+  <p:clrMapOvr>
+    <a:masterClrMapping/>
+  </p:clrMapOvr>
+</p:sld>
+</file>
+
+<file path=ppt/slides/slide6.xml><?xml version="1.0" encoding="utf-8"?>
 <p:sld xmlns:a="http://schemas.openxmlformats.org/drawingml/2006/main" xmlns:r="http://schemas.openxmlformats.org/officeDocument/2006/relationships" xmlns:p="http://schemas.openxmlformats.org/presentationml/2006/main">
   <p:cSld>
     <p:spTree>

</xml_diff>

<commit_message>
Minor adjustments to PowerPoint slides
</commit_message>
<xml_diff>
--- a/TRL_final/Textbook Rental Library - Presentation.pptx
+++ b/TRL_final/Textbook Rental Library - Presentation.pptx
@@ -10,10 +10,9 @@
     <p:sldId id="261" r:id="rId4"/>
     <p:sldId id="259" r:id="rId5"/>
     <p:sldId id="263" r:id="rId6"/>
-    <p:sldId id="262" r:id="rId7"/>
-    <p:sldId id="264" r:id="rId8"/>
-    <p:sldId id="258" r:id="rId9"/>
-    <p:sldId id="260" r:id="rId10"/>
+    <p:sldId id="264" r:id="rId7"/>
+    <p:sldId id="258" r:id="rId8"/>
+    <p:sldId id="260" r:id="rId9"/>
   </p:sldIdLst>
   <p:sldSz cx="12192000" cy="6858000"/>
   <p:notesSz cx="6858000" cy="9144000"/>
@@ -313,7 +312,7 @@
             <a:fld id="{B61BEF0D-F0BB-DE4B-95CE-6DB70DBA9567}" type="datetimeFigureOut">
               <a:rPr lang="en-US" dirty="0"/>
               <a:pPr/>
-              <a:t>12/9/2017</a:t>
+              <a:t>12/13/2017</a:t>
             </a:fld>
             <a:endParaRPr lang="en-US" dirty="0"/>
           </a:p>
@@ -648,7 +647,7 @@
             <a:fld id="{B61BEF0D-F0BB-DE4B-95CE-6DB70DBA9567}" type="datetimeFigureOut">
               <a:rPr lang="en-US" dirty="0"/>
               <a:pPr/>
-              <a:t>12/9/2017</a:t>
+              <a:t>12/13/2017</a:t>
             </a:fld>
             <a:endParaRPr lang="en-US" dirty="0"/>
           </a:p>
@@ -1046,7 +1045,7 @@
             <a:fld id="{B61BEF0D-F0BB-DE4B-95CE-6DB70DBA9567}" type="datetimeFigureOut">
               <a:rPr lang="en-US" dirty="0"/>
               <a:pPr/>
-              <a:t>12/9/2017</a:t>
+              <a:t>12/13/2017</a:t>
             </a:fld>
             <a:endParaRPr lang="en-US" dirty="0"/>
           </a:p>
@@ -1379,7 +1378,7 @@
             <a:fld id="{B61BEF0D-F0BB-DE4B-95CE-6DB70DBA9567}" type="datetimeFigureOut">
               <a:rPr lang="en-US" dirty="0"/>
               <a:pPr/>
-              <a:t>12/9/2017</a:t>
+              <a:t>12/13/2017</a:t>
             </a:fld>
             <a:endParaRPr lang="en-US" dirty="0"/>
           </a:p>
@@ -1696,7 +1695,7 @@
             <a:fld id="{B61BEF0D-F0BB-DE4B-95CE-6DB70DBA9567}" type="datetimeFigureOut">
               <a:rPr lang="en-US" dirty="0"/>
               <a:pPr/>
-              <a:t>12/9/2017</a:t>
+              <a:t>12/13/2017</a:t>
             </a:fld>
             <a:endParaRPr lang="en-US" dirty="0"/>
           </a:p>
@@ -2089,7 +2088,7 @@
             <a:fld id="{B61BEF0D-F0BB-DE4B-95CE-6DB70DBA9567}" type="datetimeFigureOut">
               <a:rPr lang="en-US" dirty="0"/>
               <a:pPr/>
-              <a:t>12/9/2017</a:t>
+              <a:t>12/13/2017</a:t>
             </a:fld>
             <a:endParaRPr lang="en-US" dirty="0"/>
           </a:p>
@@ -2343,7 +2342,7 @@
             <a:fld id="{B61BEF0D-F0BB-DE4B-95CE-6DB70DBA9567}" type="datetimeFigureOut">
               <a:rPr lang="en-US" dirty="0"/>
               <a:pPr/>
-              <a:t>12/9/2017</a:t>
+              <a:t>12/13/2017</a:t>
             </a:fld>
             <a:endParaRPr lang="en-US" dirty="0"/>
           </a:p>
@@ -2602,7 +2601,7 @@
             <a:fld id="{B61BEF0D-F0BB-DE4B-95CE-6DB70DBA9567}" type="datetimeFigureOut">
               <a:rPr lang="en-US" dirty="0"/>
               <a:pPr/>
-              <a:t>12/9/2017</a:t>
+              <a:t>12/13/2017</a:t>
             </a:fld>
             <a:endParaRPr lang="en-US" dirty="0"/>
           </a:p>
@@ -2861,7 +2860,7 @@
             <a:fld id="{B61BEF0D-F0BB-DE4B-95CE-6DB70DBA9567}" type="datetimeFigureOut">
               <a:rPr lang="en-US" dirty="0"/>
               <a:pPr/>
-              <a:t>12/9/2017</a:t>
+              <a:t>12/13/2017</a:t>
             </a:fld>
             <a:endParaRPr lang="en-US" dirty="0"/>
           </a:p>
@@ -3187,7 +3186,7 @@
             <a:fld id="{B61BEF0D-F0BB-DE4B-95CE-6DB70DBA9567}" type="datetimeFigureOut">
               <a:rPr lang="en-US" dirty="0"/>
               <a:pPr/>
-              <a:t>12/9/2017</a:t>
+              <a:t>12/13/2017</a:t>
             </a:fld>
             <a:endParaRPr lang="en-US" dirty="0"/>
           </a:p>
@@ -3507,7 +3506,7 @@
             <a:fld id="{B61BEF0D-F0BB-DE4B-95CE-6DB70DBA9567}" type="datetimeFigureOut">
               <a:rPr lang="en-US" dirty="0"/>
               <a:pPr/>
-              <a:t>12/9/2017</a:t>
+              <a:t>12/13/2017</a:t>
             </a:fld>
             <a:endParaRPr lang="en-US" dirty="0"/>
           </a:p>
@@ -3961,7 +3960,7 @@
             <a:fld id="{B61BEF0D-F0BB-DE4B-95CE-6DB70DBA9567}" type="datetimeFigureOut">
               <a:rPr lang="en-US" dirty="0"/>
               <a:pPr/>
-              <a:t>12/9/2017</a:t>
+              <a:t>12/13/2017</a:t>
             </a:fld>
             <a:endParaRPr lang="en-US" dirty="0"/>
           </a:p>
@@ -4163,7 +4162,7 @@
             <a:fld id="{B61BEF0D-F0BB-DE4B-95CE-6DB70DBA9567}" type="datetimeFigureOut">
               <a:rPr lang="en-US" dirty="0"/>
               <a:pPr/>
-              <a:t>12/9/2017</a:t>
+              <a:t>12/13/2017</a:t>
             </a:fld>
             <a:endParaRPr lang="en-US" dirty="0"/>
           </a:p>
@@ -4337,7 +4336,7 @@
             <a:fld id="{B61BEF0D-F0BB-DE4B-95CE-6DB70DBA9567}" type="datetimeFigureOut">
               <a:rPr lang="en-US" dirty="0"/>
               <a:pPr/>
-              <a:t>12/9/2017</a:t>
+              <a:t>12/13/2017</a:t>
             </a:fld>
             <a:endParaRPr lang="en-US" dirty="0"/>
           </a:p>
@@ -4667,7 +4666,7 @@
             <a:fld id="{B61BEF0D-F0BB-DE4B-95CE-6DB70DBA9567}" type="datetimeFigureOut">
               <a:rPr lang="en-US" dirty="0"/>
               <a:pPr/>
-              <a:t>12/9/2017</a:t>
+              <a:t>12/13/2017</a:t>
             </a:fld>
             <a:endParaRPr lang="en-US" dirty="0"/>
           </a:p>
@@ -5009,7 +5008,7 @@
             <a:fld id="{B61BEF0D-F0BB-DE4B-95CE-6DB70DBA9567}" type="datetimeFigureOut">
               <a:rPr lang="en-US" dirty="0"/>
               <a:pPr/>
-              <a:t>12/9/2017</a:t>
+              <a:t>12/13/2017</a:t>
             </a:fld>
             <a:endParaRPr lang="en-US" dirty="0"/>
           </a:p>
@@ -7123,7 +7122,7 @@
             <a:fld id="{B61BEF0D-F0BB-DE4B-95CE-6DB70DBA9567}" type="datetimeFigureOut">
               <a:rPr lang="en-US" dirty="0"/>
               <a:pPr/>
-              <a:t>12/9/2017</a:t>
+              <a:t>12/13/2017</a:t>
             </a:fld>
             <a:endParaRPr lang="en-US" dirty="0"/>
           </a:p>
@@ -7753,13 +7752,8 @@
           <a:p>
             <a:r>
               <a:rPr lang="en-US" b="1" dirty="0"/>
-              <a:t>Use Cases &amp; </a:t>
-            </a:r>
-            <a:r>
-              <a:rPr lang="en-US" b="1" dirty="0" err="1"/>
-              <a:t>DoCD</a:t>
-            </a:r>
-            <a:endParaRPr lang="en-US" b="1" dirty="0"/>
+              <a:t>Use Cases</a:t>
+            </a:r>
           </a:p>
         </p:txBody>
       </p:sp>
@@ -7983,13 +7977,7 @@
           <a:p>
             <a:r>
               <a:rPr lang="en-US" sz="2400" b="1" dirty="0"/>
-              <a:t>JUnit Tests &amp; Coverage</a:t>
-            </a:r>
-          </a:p>
-          <a:p>
-            <a:r>
-              <a:rPr lang="en-US" sz="2400" b="1" dirty="0"/>
-              <a:t>Software Class Diagram</a:t>
+              <a:t>Lookup Patron &amp; Copy</a:t>
             </a:r>
           </a:p>
         </p:txBody>
@@ -8128,7 +8116,7 @@
           <p:cNvPr id="2" name="Title 1">
             <a:extLst>
               <a:ext uri="{FF2B5EF4-FFF2-40B4-BE49-F238E27FC236}">
-                <a16:creationId xmlns:a16="http://schemas.microsoft.com/office/drawing/2014/main" id="{EC069840-D3E1-4199-A00F-964672C03CF1}"/>
+                <a16:creationId xmlns:a16="http://schemas.microsoft.com/office/drawing/2014/main" id="{963AE825-AA2A-4A91-86D4-EEE9AE812F5E}"/>
               </a:ext>
             </a:extLst>
           </p:cNvPr>
@@ -8146,7 +8134,7 @@
           <a:p>
             <a:r>
               <a:rPr lang="en-US" b="1" dirty="0"/>
-              <a:t>Demonstration: Core Functionality</a:t>
+              <a:t>Software Class Diagram</a:t>
             </a:r>
           </a:p>
         </p:txBody>
@@ -8156,7 +8144,7 @@
           <p:cNvPr id="3" name="Content Placeholder 2">
             <a:extLst>
               <a:ext uri="{FF2B5EF4-FFF2-40B4-BE49-F238E27FC236}">
-                <a16:creationId xmlns:a16="http://schemas.microsoft.com/office/drawing/2014/main" id="{D17781E6-1EBB-4508-BB33-4A989C49B696}"/>
+                <a16:creationId xmlns:a16="http://schemas.microsoft.com/office/drawing/2014/main" id="{F0639685-624F-4C83-9613-F92CAB9FA829}"/>
               </a:ext>
             </a:extLst>
           </p:cNvPr>
@@ -8169,34 +8157,17 @@
         </p:nvSpPr>
         <p:spPr/>
         <p:txBody>
-          <a:bodyPr>
-            <a:normAutofit/>
-          </a:bodyPr>
+          <a:bodyPr/>
           <a:lstStyle/>
           <a:p>
-            <a:r>
-              <a:rPr lang="en-US" sz="2400" b="1" dirty="0"/>
-              <a:t>Out</a:t>
-            </a:r>
-          </a:p>
-          <a:p>
-            <a:r>
-              <a:rPr lang="en-US" sz="2400" b="1" dirty="0"/>
-              <a:t>In</a:t>
-            </a:r>
-          </a:p>
-          <a:p>
-            <a:r>
-              <a:rPr lang="en-US" sz="2400" b="1" dirty="0"/>
-              <a:t>Lookup Patron &amp; Copy</a:t>
-            </a:r>
+            <a:endParaRPr lang="en-US" dirty="0"/>
           </a:p>
         </p:txBody>
       </p:sp>
     </p:spTree>
     <p:extLst>
       <p:ext uri="{BB962C8B-B14F-4D97-AF65-F5344CB8AC3E}">
-        <p14:creationId xmlns:p14="http://schemas.microsoft.com/office/powerpoint/2010/main" val="86562513"/>
+        <p14:creationId xmlns:p14="http://schemas.microsoft.com/office/powerpoint/2010/main" val="2138715194"/>
       </p:ext>
     </p:extLst>
   </p:cSld>
@@ -8228,89 +8199,6 @@
           <p:cNvPr id="2" name="Title 1">
             <a:extLst>
               <a:ext uri="{FF2B5EF4-FFF2-40B4-BE49-F238E27FC236}">
-                <a16:creationId xmlns:a16="http://schemas.microsoft.com/office/drawing/2014/main" id="{963AE825-AA2A-4A91-86D4-EEE9AE812F5E}"/>
-              </a:ext>
-            </a:extLst>
-          </p:cNvPr>
-          <p:cNvSpPr>
-            <a:spLocks noGrp="1"/>
-          </p:cNvSpPr>
-          <p:nvPr>
-            <p:ph type="title"/>
-          </p:nvPr>
-        </p:nvSpPr>
-        <p:spPr/>
-        <p:txBody>
-          <a:bodyPr/>
-          <a:lstStyle/>
-          <a:p>
-            <a:r>
-              <a:rPr lang="en-US" b="1" dirty="0"/>
-              <a:t>Software Class Diagram</a:t>
-            </a:r>
-          </a:p>
-        </p:txBody>
-      </p:sp>
-      <p:sp>
-        <p:nvSpPr>
-          <p:cNvPr id="3" name="Content Placeholder 2">
-            <a:extLst>
-              <a:ext uri="{FF2B5EF4-FFF2-40B4-BE49-F238E27FC236}">
-                <a16:creationId xmlns:a16="http://schemas.microsoft.com/office/drawing/2014/main" id="{F0639685-624F-4C83-9613-F92CAB9FA829}"/>
-              </a:ext>
-            </a:extLst>
-          </p:cNvPr>
-          <p:cNvSpPr>
-            <a:spLocks noGrp="1"/>
-          </p:cNvSpPr>
-          <p:nvPr>
-            <p:ph idx="1"/>
-          </p:nvPr>
-        </p:nvSpPr>
-        <p:spPr/>
-        <p:txBody>
-          <a:bodyPr/>
-          <a:lstStyle/>
-          <a:p>
-            <a:endParaRPr lang="en-US" dirty="0"/>
-          </a:p>
-        </p:txBody>
-      </p:sp>
-    </p:spTree>
-    <p:extLst>
-      <p:ext uri="{BB962C8B-B14F-4D97-AF65-F5344CB8AC3E}">
-        <p14:creationId xmlns:p14="http://schemas.microsoft.com/office/powerpoint/2010/main" val="2138715194"/>
-      </p:ext>
-    </p:extLst>
-  </p:cSld>
-  <p:clrMapOvr>
-    <a:masterClrMapping/>
-  </p:clrMapOvr>
-</p:sld>
-</file>
-
-<file path=ppt/slides/slide8.xml><?xml version="1.0" encoding="utf-8"?>
-<p:sld xmlns:a="http://schemas.openxmlformats.org/drawingml/2006/main" xmlns:r="http://schemas.openxmlformats.org/officeDocument/2006/relationships" xmlns:p="http://schemas.openxmlformats.org/presentationml/2006/main">
-  <p:cSld>
-    <p:spTree>
-      <p:nvGrpSpPr>
-        <p:cNvPr id="1" name=""/>
-        <p:cNvGrpSpPr/>
-        <p:nvPr/>
-      </p:nvGrpSpPr>
-      <p:grpSpPr>
-        <a:xfrm>
-          <a:off x="0" y="0"/>
-          <a:ext cx="0" cy="0"/>
-          <a:chOff x="0" y="0"/>
-          <a:chExt cx="0" cy="0"/>
-        </a:xfrm>
-      </p:grpSpPr>
-      <p:sp>
-        <p:nvSpPr>
-          <p:cNvPr id="2" name="Title 1">
-            <a:extLst>
-              <a:ext uri="{FF2B5EF4-FFF2-40B4-BE49-F238E27FC236}">
                 <a16:creationId xmlns:a16="http://schemas.microsoft.com/office/drawing/2014/main" id="{8EFEE283-A7D6-419E-9669-777D0BBB1B02}"/>
               </a:ext>
             </a:extLst>
@@ -8419,7 +8307,7 @@
 </p:sld>
 </file>
 
-<file path=ppt/slides/slide9.xml><?xml version="1.0" encoding="utf-8"?>
+<file path=ppt/slides/slide8.xml><?xml version="1.0" encoding="utf-8"?>
 <p:sld xmlns:a="http://schemas.openxmlformats.org/drawingml/2006/main" xmlns:r="http://schemas.openxmlformats.org/officeDocument/2006/relationships" xmlns:p="http://schemas.openxmlformats.org/presentationml/2006/main">
   <p:cSld>
     <p:spTree>

</xml_diff>